<commit_message>
adds "Observer Pattern mit Java API.zip"
this is a second project to show the observer pattern with
the JavaFX API
</commit_message>
<xml_diff>
--- a/Präsentation Observer Pattern.pptx
+++ b/Präsentation Observer Pattern.pptx
@@ -16,6 +16,8 @@
     <p:sldId id="264" r:id="rId10"/>
     <p:sldId id="265" r:id="rId11"/>
     <p:sldId id="266" r:id="rId12"/>
+    <p:sldId id="267" r:id="rId13"/>
+    <p:sldId id="268" r:id="rId14"/>
   </p:sldIdLst>
   <p:sldSz cx="12192000" cy="6858000"/>
   <p:notesSz cx="6858000" cy="9144000"/>
@@ -114,6 +116,11 @@
       </a:defRPr>
     </a:lvl9pPr>
   </p:defaultTextStyle>
+  <p:extLst>
+    <p:ext uri="{EFAFB233-063F-42B5-8137-9DF3F51BA10A}">
+      <p15:sldGuideLst xmlns:p15="http://schemas.microsoft.com/office/powerpoint/2012/main"/>
+    </p:ext>
+  </p:extLst>
 </p:presentation>
 </file>
 
@@ -5995,12 +6002,45 @@
           <a:chExt cx="0" cy="0"/>
         </a:xfrm>
       </p:grpSpPr>
+      <p:sp>
+        <p:nvSpPr>
+          <p:cNvPr id="5" name="Titel 1">
+            <a:extLst>
+              <a:ext uri="{FF2B5EF4-FFF2-40B4-BE49-F238E27FC236}">
+                <a16:creationId xmlns:a16="http://schemas.microsoft.com/office/drawing/2014/main" id="{1F341ECE-7B9F-48E6-B666-AC40A8505790}"/>
+              </a:ext>
+            </a:extLst>
+          </p:cNvPr>
+          <p:cNvSpPr>
+            <a:spLocks noGrp="1"/>
+          </p:cNvSpPr>
+          <p:nvPr>
+            <p:ph type="title"/>
+          </p:nvPr>
+        </p:nvSpPr>
+        <p:spPr>
+          <a:xfrm>
+            <a:off x="677334" y="609600"/>
+            <a:ext cx="8596668" cy="1320800"/>
+          </a:xfrm>
+        </p:spPr>
+        <p:txBody>
+          <a:bodyPr/>
+          <a:lstStyle/>
+          <a:p>
+            <a:r>
+              <a:rPr lang="de-DE" dirty="0"/>
+              <a:t>Observer Muster in der Java API</a:t>
+            </a:r>
+          </a:p>
+        </p:txBody>
+      </p:sp>
       <p:pic>
         <p:nvPicPr>
-          <p:cNvPr id="4" name="Grafik 3">
+          <p:cNvPr id="6" name="Grafik 5">
             <a:extLst>
               <a:ext uri="{FF2B5EF4-FFF2-40B4-BE49-F238E27FC236}">
-                <a16:creationId xmlns:a16="http://schemas.microsoft.com/office/drawing/2014/main" id="{8A1443A7-E488-4651-B2CE-AF02148EDEF4}"/>
+                <a16:creationId xmlns:a16="http://schemas.microsoft.com/office/drawing/2014/main" id="{4AF4E79A-66FA-44CC-AD0A-DAE9BF3AC73B}"/>
               </a:ext>
             </a:extLst>
           </p:cNvPr>
@@ -6010,58 +6050,166 @@
           <p:nvPr/>
         </p:nvPicPr>
         <p:blipFill>
-          <a:blip r:embed="rId2"/>
+          <a:blip r:embed="rId2">
+            <a:extLst>
+              <a:ext uri="{28A0092B-C50C-407E-A947-70E740481C1C}">
+                <a14:useLocalDpi xmlns:a14="http://schemas.microsoft.com/office/drawing/2010/main" val="0"/>
+              </a:ext>
+            </a:extLst>
+          </a:blip>
           <a:stretch>
             <a:fillRect/>
           </a:stretch>
         </p:blipFill>
         <p:spPr>
           <a:xfrm>
-            <a:off x="677334" y="1270000"/>
-            <a:ext cx="7867650" cy="5686425"/>
+            <a:off x="677334" y="1754604"/>
+            <a:ext cx="8565062" cy="3611479"/>
           </a:xfrm>
           <a:prstGeom prst="rect">
             <a:avLst/>
           </a:prstGeom>
         </p:spPr>
       </p:pic>
-      <p:sp>
-        <p:nvSpPr>
-          <p:cNvPr id="5" name="Titel 1">
-            <a:extLst>
-              <a:ext uri="{FF2B5EF4-FFF2-40B4-BE49-F238E27FC236}">
-                <a16:creationId xmlns:a16="http://schemas.microsoft.com/office/drawing/2014/main" id="{1F341ECE-7B9F-48E6-B666-AC40A8505790}"/>
-              </a:ext>
-            </a:extLst>
-          </p:cNvPr>
-          <p:cNvSpPr>
-            <a:spLocks noGrp="1"/>
-          </p:cNvSpPr>
-          <p:nvPr>
-            <p:ph type="title"/>
-          </p:nvPr>
-        </p:nvSpPr>
-        <p:spPr>
-          <a:xfrm>
-            <a:off x="677334" y="609600"/>
-            <a:ext cx="8596668" cy="1320800"/>
-          </a:xfrm>
-        </p:spPr>
-        <p:txBody>
-          <a:bodyPr/>
-          <a:lstStyle/>
-          <a:p>
-            <a:r>
-              <a:rPr lang="de-DE" dirty="0"/>
-              <a:t>Observer Muster in der Java API</a:t>
-            </a:r>
-          </a:p>
-        </p:txBody>
-      </p:sp>
     </p:spTree>
     <p:extLst>
       <p:ext uri="{BB962C8B-B14F-4D97-AF65-F5344CB8AC3E}">
         <p14:creationId xmlns:p14="http://schemas.microsoft.com/office/powerpoint/2010/main" val="1990978915"/>
+      </p:ext>
+    </p:extLst>
+  </p:cSld>
+  <p:clrMapOvr>
+    <a:masterClrMapping/>
+  </p:clrMapOvr>
+</p:sld>
+</file>
+
+<file path=ppt/slides/slide12.xml><?xml version="1.0" encoding="utf-8"?>
+<p:sld xmlns:a="http://schemas.openxmlformats.org/drawingml/2006/main" xmlns:r="http://schemas.openxmlformats.org/officeDocument/2006/relationships" xmlns:p="http://schemas.openxmlformats.org/presentationml/2006/main">
+  <p:cSld>
+    <p:spTree>
+      <p:nvGrpSpPr>
+        <p:cNvPr id="1" name=""/>
+        <p:cNvGrpSpPr/>
+        <p:nvPr/>
+      </p:nvGrpSpPr>
+      <p:grpSpPr>
+        <a:xfrm>
+          <a:off x="0" y="0"/>
+          <a:ext cx="0" cy="0"/>
+          <a:chOff x="0" y="0"/>
+          <a:chExt cx="0" cy="0"/>
+        </a:xfrm>
+      </p:grpSpPr>
+      <p:sp>
+        <p:nvSpPr>
+          <p:cNvPr id="5" name="Titel 4">
+            <a:extLst>
+              <a:ext uri="{FF2B5EF4-FFF2-40B4-BE49-F238E27FC236}">
+                <a16:creationId xmlns:a16="http://schemas.microsoft.com/office/drawing/2014/main" id="{97182A3B-ECB1-4ECC-9A5A-EC97BEDA7B9B}"/>
+              </a:ext>
+            </a:extLst>
+          </p:cNvPr>
+          <p:cNvSpPr>
+            <a:spLocks noGrp="1"/>
+          </p:cNvSpPr>
+          <p:nvPr>
+            <p:ph type="title"/>
+          </p:nvPr>
+        </p:nvSpPr>
+        <p:spPr>
+          <a:xfrm>
+            <a:off x="1540933" y="3073400"/>
+            <a:ext cx="7230534" cy="973667"/>
+          </a:xfrm>
+        </p:spPr>
+        <p:txBody>
+          <a:bodyPr/>
+          <a:lstStyle/>
+          <a:p>
+            <a:r>
+              <a:rPr lang="de-DE" dirty="0"/>
+              <a:t>Demonstration der Anwendung</a:t>
+            </a:r>
+          </a:p>
+        </p:txBody>
+      </p:sp>
+    </p:spTree>
+    <p:extLst>
+      <p:ext uri="{BB962C8B-B14F-4D97-AF65-F5344CB8AC3E}">
+        <p14:creationId xmlns:p14="http://schemas.microsoft.com/office/powerpoint/2010/main" val="3933216352"/>
+      </p:ext>
+    </p:extLst>
+  </p:cSld>
+  <p:clrMapOvr>
+    <a:masterClrMapping/>
+  </p:clrMapOvr>
+</p:sld>
+</file>
+
+<file path=ppt/slides/slide13.xml><?xml version="1.0" encoding="utf-8"?>
+<p:sld xmlns:a="http://schemas.openxmlformats.org/drawingml/2006/main" xmlns:r="http://schemas.openxmlformats.org/officeDocument/2006/relationships" xmlns:p="http://schemas.openxmlformats.org/presentationml/2006/main">
+  <p:cSld>
+    <p:spTree>
+      <p:nvGrpSpPr>
+        <p:cNvPr id="1" name=""/>
+        <p:cNvGrpSpPr/>
+        <p:nvPr/>
+      </p:nvGrpSpPr>
+      <p:grpSpPr>
+        <a:xfrm>
+          <a:off x="0" y="0"/>
+          <a:ext cx="0" cy="0"/>
+          <a:chOff x="0" y="0"/>
+          <a:chExt cx="0" cy="0"/>
+        </a:xfrm>
+      </p:grpSpPr>
+      <p:sp>
+        <p:nvSpPr>
+          <p:cNvPr id="5" name="Titel 4">
+            <a:extLst>
+              <a:ext uri="{FF2B5EF4-FFF2-40B4-BE49-F238E27FC236}">
+                <a16:creationId xmlns:a16="http://schemas.microsoft.com/office/drawing/2014/main" id="{97182A3B-ECB1-4ECC-9A5A-EC97BEDA7B9B}"/>
+              </a:ext>
+            </a:extLst>
+          </p:cNvPr>
+          <p:cNvSpPr>
+            <a:spLocks noGrp="1"/>
+          </p:cNvSpPr>
+          <p:nvPr>
+            <p:ph type="title"/>
+          </p:nvPr>
+        </p:nvSpPr>
+        <p:spPr>
+          <a:xfrm>
+            <a:off x="1540933" y="3073400"/>
+            <a:ext cx="7230534" cy="973667"/>
+          </a:xfrm>
+        </p:spPr>
+        <p:txBody>
+          <a:bodyPr>
+            <a:noAutofit/>
+          </a:bodyPr>
+          <a:lstStyle/>
+          <a:p>
+            <a:r>
+              <a:rPr lang="de-DE" sz="4400" dirty="0"/>
+              <a:t>Vielen Dank für die </a:t>
+            </a:r>
+            <a:br>
+              <a:rPr lang="de-DE" sz="4400" dirty="0"/>
+            </a:br>
+            <a:r>
+              <a:rPr lang="de-DE" sz="4400" dirty="0"/>
+              <a:t>Aufmerksamkeit!</a:t>
+            </a:r>
+          </a:p>
+        </p:txBody>
+      </p:sp>
+    </p:spTree>
+    <p:extLst>
+      <p:ext uri="{BB962C8B-B14F-4D97-AF65-F5344CB8AC3E}">
+        <p14:creationId xmlns:p14="http://schemas.microsoft.com/office/powerpoint/2010/main" val="1721718023"/>
       </p:ext>
     </p:extLst>
   </p:cSld>

</xml_diff>